<commit_message>
fixed spelling and grammar.
</commit_message>
<xml_diff>
--- a/documentation/Presentation.pptx
+++ b/documentation/Presentation.pptx
@@ -6330,7 +6330,7 @@
           <a:p>
             <a:r>
               <a:rPr lang="en-US" dirty="0"/>
-              <a:t>Team Organization (1 min)</a:t>
+              <a:t>Team Organization</a:t>
             </a:r>
           </a:p>
         </p:txBody>
@@ -6366,15 +6366,7 @@
             <a:pPr lvl="1"/>
             <a:r>
               <a:rPr lang="en-US" dirty="0"/>
-              <a:t>We are using </a:t>
-            </a:r>
-            <a:r>
-              <a:rPr lang="en-US" dirty="0" err="1"/>
-              <a:t>Groupme</a:t>
-            </a:r>
-            <a:r>
-              <a:rPr lang="en-US" dirty="0"/>
-              <a:t> to communicate with each other.</a:t>
+              <a:t>We are using GroupMe to communicate with each other.</a:t>
             </a:r>
           </a:p>
           <a:p>
@@ -6387,15 +6379,7 @@
             <a:pPr lvl="1"/>
             <a:r>
               <a:rPr lang="en-US" dirty="0"/>
-              <a:t>We are pair programming to support each other as this is our first time working with </a:t>
-            </a:r>
-            <a:r>
-              <a:rPr lang="en-US" dirty="0" err="1"/>
-              <a:t>Github</a:t>
-            </a:r>
-            <a:r>
-              <a:rPr lang="en-US" dirty="0"/>
-              <a:t>.</a:t>
+              <a:t>We are pair programming to support each other as this is our first time working with GitHub.</a:t>
             </a:r>
           </a:p>
           <a:p>
@@ -6465,7 +6449,7 @@
           <a:p>
             <a:r>
               <a:rPr lang="en-US" dirty="0"/>
-              <a:t>Coding Styles and Comments (1 min)</a:t>
+              <a:t>Coding Styles and Comments</a:t>
             </a:r>
           </a:p>
         </p:txBody>
@@ -6499,10 +6483,9 @@
           <a:p>
             <a:pPr lvl="1"/>
             <a:r>
-              <a:rPr lang="en-US" dirty="0" err="1"/>
-              <a:t>Camelcode</a:t>
-            </a:r>
-            <a:endParaRPr lang="en-US" dirty="0"/>
+              <a:rPr lang="en-US" dirty="0"/>
+              <a:t>Camel code</a:t>
+            </a:r>
           </a:p>
           <a:p>
             <a:pPr lvl="1"/>
@@ -6510,10 +6493,7 @@
               <a:rPr lang="en-US" dirty="0" err="1"/>
               <a:t>Sqlite</a:t>
             </a:r>
-            <a:r>
-              <a:rPr lang="en-US" dirty="0"/>
-              <a:t>???</a:t>
-            </a:r>
+            <a:endParaRPr lang="en-US" dirty="0"/>
           </a:p>
           <a:p>
             <a:pPr lvl="1"/>
@@ -6608,7 +6588,7 @@
           <a:p>
             <a:r>
               <a:rPr lang="en-US" dirty="0"/>
-              <a:t>Design Pattern</a:t>
+              <a:t>Design Pattern (proxy)</a:t>
             </a:r>
           </a:p>
         </p:txBody>

</xml_diff>

<commit_message>
added links to github in powerpoint
</commit_message>
<xml_diff>
--- a/documentation/Presentation.pptx
+++ b/documentation/Presentation.pptx
@@ -6808,12 +6808,33 @@
         </p:nvSpPr>
         <p:spPr/>
         <p:txBody>
-          <a:bodyPr/>
+          <a:bodyPr>
+            <a:normAutofit fontScale="90000"/>
+          </a:bodyPr>
           <a:lstStyle/>
           <a:p>
             <a:r>
               <a:rPr lang="en-US" dirty="0"/>
-              <a:t>Refactoring </a:t>
+              <a:t>Refactoring</a:t>
+            </a:r>
+            <a:br>
+              <a:rPr lang="en-US" dirty="0"/>
+            </a:br>
+            <a:br>
+              <a:rPr lang="en-US" dirty="0"/>
+            </a:br>
+            <a:br>
+              <a:rPr lang="en-US" dirty="0"/>
+            </a:br>
+            <a:br>
+              <a:rPr lang="en-US" dirty="0"/>
+            </a:br>
+            <a:br>
+              <a:rPr lang="en-US" dirty="0"/>
+            </a:br>
+            <a:r>
+              <a:rPr lang="en-US" dirty="0"/>
+              <a:t>https://github.com/Roger-Chan/3354-FastTrac/commits/master </a:t>
             </a:r>
           </a:p>
         </p:txBody>

</xml_diff>

<commit_message>
Published the testing slide
</commit_message>
<xml_diff>
--- a/documentation/Presentation.pptx
+++ b/documentation/Presentation.pptx
@@ -6965,6 +6965,32 @@
           <a:bodyPr/>
           <a:lstStyle/>
           <a:p>
+            <a:r>
+              <a:rPr lang="en-US" dirty="0"/>
+              <a:t>Our philosophy to testing has been to focus on getting working code first and test as much as possible during the coding process.</a:t>
+            </a:r>
+          </a:p>
+          <a:p>
+            <a:r>
+              <a:rPr lang="en-US" dirty="0"/>
+              <a:t>Because this is our first time using Junit we elected to test manually up until final debugging. </a:t>
+            </a:r>
+          </a:p>
+          <a:p>
+            <a:r>
+              <a:rPr lang="en-US" dirty="0"/>
+              <a:t>We have regularly used manual testing to fix collisions and other errors that have come up during the code writing phase of our project. </a:t>
+            </a:r>
+          </a:p>
+          <a:p>
+            <a:r>
+              <a:rPr lang="en-US" dirty="0"/>
+              <a:t>We are working diligently to have Junit testing completed </a:t>
+            </a:r>
+            <a:r>
+              <a:rPr lang="en-US"/>
+              <a:t>before the final due date.</a:t>
+            </a:r>
             <a:endParaRPr lang="en-US" dirty="0"/>
           </a:p>
         </p:txBody>

</xml_diff>

<commit_message>
Final Final draft of powerpoint
</commit_message>
<xml_diff>
--- a/documentation/Presentation.pptx
+++ b/documentation/Presentation.pptx
@@ -14,7 +14,8 @@
     <p:sldId id="264" r:id="rId8"/>
     <p:sldId id="266" r:id="rId9"/>
     <p:sldId id="261" r:id="rId10"/>
-    <p:sldId id="265" r:id="rId11"/>
+    <p:sldId id="267" r:id="rId11"/>
+    <p:sldId id="265" r:id="rId12"/>
   </p:sldIdLst>
   <p:sldSz cx="9144000" cy="6858000" type="screen4x3"/>
   <p:notesSz cx="6858000" cy="9144000"/>
@@ -6153,6 +6154,93 @@
           <p:cNvPr id="2" name="Title 1">
             <a:extLst>
               <a:ext uri="{FF2B5EF4-FFF2-40B4-BE49-F238E27FC236}">
+                <a16:creationId xmlns:a16="http://schemas.microsoft.com/office/drawing/2014/main" id="{C5F0701F-CADA-4405-99ED-A0FD836E9700}"/>
+              </a:ext>
+            </a:extLst>
+          </p:cNvPr>
+          <p:cNvSpPr>
+            <a:spLocks noGrp="1"/>
+          </p:cNvSpPr>
+          <p:nvPr>
+            <p:ph type="title"/>
+          </p:nvPr>
+        </p:nvSpPr>
+        <p:spPr/>
+        <p:txBody>
+          <a:bodyPr/>
+          <a:lstStyle/>
+          <a:p>
+            <a:r>
+              <a:rPr lang="en-US" dirty="0"/>
+              <a:t>Junit Prototype</a:t>
+            </a:r>
+          </a:p>
+        </p:txBody>
+      </p:sp>
+      <p:pic>
+        <p:nvPicPr>
+          <p:cNvPr id="5" name="Content Placeholder 4">
+            <a:extLst>
+              <a:ext uri="{FF2B5EF4-FFF2-40B4-BE49-F238E27FC236}">
+                <a16:creationId xmlns:a16="http://schemas.microsoft.com/office/drawing/2014/main" id="{EC323573-3306-4E19-AD22-D634B3EE86D3}"/>
+              </a:ext>
+            </a:extLst>
+          </p:cNvPr>
+          <p:cNvPicPr>
+            <a:picLocks noGrp="1" noChangeAspect="1"/>
+          </p:cNvPicPr>
+          <p:nvPr>
+            <p:ph idx="1"/>
+          </p:nvPr>
+        </p:nvPicPr>
+        <p:blipFill>
+          <a:blip r:embed="rId2"/>
+          <a:stretch>
+            <a:fillRect/>
+          </a:stretch>
+        </p:blipFill>
+        <p:spPr>
+          <a:xfrm>
+            <a:off x="609600" y="2398817"/>
+            <a:ext cx="6348413" cy="3404978"/>
+          </a:xfrm>
+        </p:spPr>
+      </p:pic>
+    </p:spTree>
+    <p:extLst>
+      <p:ext uri="{BB962C8B-B14F-4D97-AF65-F5344CB8AC3E}">
+        <p14:creationId xmlns:p14="http://schemas.microsoft.com/office/powerpoint/2010/main" val="189621083"/>
+      </p:ext>
+    </p:extLst>
+  </p:cSld>
+  <p:clrMapOvr>
+    <a:masterClrMapping/>
+  </p:clrMapOvr>
+</p:sld>
+</file>
+
+<file path=ppt/slides/slide11.xml><?xml version="1.0" encoding="utf-8"?>
+<p:sld xmlns:a="http://schemas.openxmlformats.org/drawingml/2006/main" xmlns:r="http://schemas.openxmlformats.org/officeDocument/2006/relationships" xmlns:p="http://schemas.openxmlformats.org/presentationml/2006/main">
+  <p:cSld>
+    <p:spTree>
+      <p:nvGrpSpPr>
+        <p:cNvPr id="1" name=""/>
+        <p:cNvGrpSpPr/>
+        <p:nvPr/>
+      </p:nvGrpSpPr>
+      <p:grpSpPr>
+        <a:xfrm>
+          <a:off x="0" y="0"/>
+          <a:ext cx="0" cy="0"/>
+          <a:chOff x="0" y="0"/>
+          <a:chExt cx="0" cy="0"/>
+        </a:xfrm>
+      </p:grpSpPr>
+      <p:sp>
+        <p:nvSpPr>
+          <p:cNvPr id="2" name="Title 1">
+            <a:extLst>
+              <a:ext uri="{FF2B5EF4-FFF2-40B4-BE49-F238E27FC236}">
                 <a16:creationId xmlns:a16="http://schemas.microsoft.com/office/drawing/2014/main" id="{63A910B7-A1E9-425F-91C7-4C410C4EC7C8}"/>
               </a:ext>
             </a:extLst>

</xml_diff>